<commit_message>
[2024-03-29] - Modified - gimseongbin
</commit_message>
<xml_diff>
--- a/assets/lab/Lab_workbook_Assembly_2.pptx
+++ b/assets/lab/Lab_workbook_Assembly_2.pptx
@@ -4267,14 +4267,14 @@
           <p:nvPr>
             <p:extLst>
               <p:ext uri="{D42A27DB-BD31-4B8C-83A1-F6EECF244321}">
-                <p14:modId xmlns:p14="http://schemas.microsoft.com/office/powerpoint/2010/main" val="3866457057"/>
+                <p14:modId xmlns:p14="http://schemas.microsoft.com/office/powerpoint/2010/main" val="4143952304"/>
               </p:ext>
             </p:extLst>
           </p:nvPr>
         </p:nvGraphicFramePr>
         <p:xfrm>
           <a:off x="650572" y="2172950"/>
-          <a:ext cx="10627028" cy="3893200"/>
+          <a:ext cx="10627028" cy="6126480"/>
         </p:xfrm>
         <a:graphic>
           <a:graphicData uri="http://schemas.openxmlformats.org/drawingml/2006/table">
@@ -4463,61 +4463,85 @@
                     <a:lstStyle/>
                     <a:p>
                       <a:pPr latinLnBrk="1"/>
-                      <a:endParaRPr lang="ko-KR" altLang="en-US"/>
-                    </a:p>
-                  </a:txBody>
-                  <a:tcPr/>
-                </a:tc>
-                <a:tc>
-                  <a:txBody>
-                    <a:bodyPr/>
-                    <a:lstStyle/>
-                    <a:p>
-                      <a:pPr latinLnBrk="1"/>
-                      <a:endParaRPr lang="ko-KR" altLang="en-US"/>
-                    </a:p>
-                  </a:txBody>
-                  <a:tcPr/>
-                </a:tc>
-                <a:tc>
-                  <a:txBody>
-                    <a:bodyPr/>
-                    <a:lstStyle/>
-                    <a:p>
-                      <a:pPr latinLnBrk="1"/>
-                      <a:endParaRPr lang="ko-KR" altLang="en-US"/>
-                    </a:p>
-                  </a:txBody>
-                  <a:tcPr/>
-                </a:tc>
-                <a:tc>
-                  <a:txBody>
-                    <a:bodyPr/>
-                    <a:lstStyle/>
-                    <a:p>
-                      <a:pPr latinLnBrk="1"/>
-                      <a:endParaRPr lang="ko-KR" altLang="en-US" dirty="0"/>
-                    </a:p>
-                  </a:txBody>
-                  <a:tcPr/>
-                </a:tc>
-                <a:tc>
-                  <a:txBody>
-                    <a:bodyPr/>
-                    <a:lstStyle/>
-                    <a:p>
-                      <a:pPr latinLnBrk="1"/>
-                      <a:endParaRPr lang="ko-KR" altLang="en-US" dirty="0"/>
-                    </a:p>
-                  </a:txBody>
-                  <a:tcPr/>
-                </a:tc>
-                <a:tc>
-                  <a:txBody>
-                    <a:bodyPr/>
-                    <a:lstStyle/>
-                    <a:p>
-                      <a:pPr latinLnBrk="1"/>
+                      <a:r>
+                        <a:rPr lang="en-US" altLang="ko-KR" dirty="0"/>
+                        <a:t>0xF0000000</a:t>
+                      </a:r>
+                      <a:endParaRPr lang="ko-KR" altLang="en-US" dirty="0"/>
+                    </a:p>
+                  </a:txBody>
+                  <a:tcPr/>
+                </a:tc>
+                <a:tc>
+                  <a:txBody>
+                    <a:bodyPr/>
+                    <a:lstStyle/>
+                    <a:p>
+                      <a:pPr latinLnBrk="1"/>
+                      <a:r>
+                        <a:rPr lang="en-US" altLang="ko-KR" dirty="0"/>
+                        <a:t>0x60000000</a:t>
+                      </a:r>
+                      <a:endParaRPr lang="ko-KR" altLang="en-US" dirty="0"/>
+                    </a:p>
+                  </a:txBody>
+                  <a:tcPr/>
+                </a:tc>
+                <a:tc>
+                  <a:txBody>
+                    <a:bodyPr/>
+                    <a:lstStyle/>
+                    <a:p>
+                      <a:pPr latinLnBrk="1"/>
+                      <a:r>
+                        <a:rPr lang="en-US" altLang="ko-KR" dirty="0"/>
+                        <a:t>0x50000000</a:t>
+                      </a:r>
+                      <a:endParaRPr lang="ko-KR" altLang="en-US" dirty="0"/>
+                    </a:p>
+                  </a:txBody>
+                  <a:tcPr/>
+                </a:tc>
+                <a:tc>
+                  <a:txBody>
+                    <a:bodyPr/>
+                    <a:lstStyle/>
+                    <a:p>
+                      <a:pPr latinLnBrk="1"/>
+                      <a:r>
+                        <a:rPr lang="en-US" altLang="ko-KR" dirty="0"/>
+                        <a:t>0x8</a:t>
+                      </a:r>
+                      <a:endParaRPr lang="ko-KR" altLang="en-US" dirty="0"/>
+                    </a:p>
+                  </a:txBody>
+                  <a:tcPr/>
+                </a:tc>
+                <a:tc>
+                  <a:txBody>
+                    <a:bodyPr/>
+                    <a:lstStyle/>
+                    <a:p>
+                      <a:pPr latinLnBrk="1"/>
+                      <a:r>
+                        <a:rPr lang="en-US" altLang="ko-KR" dirty="0" err="1"/>
+                        <a:t>nzcv</a:t>
+                      </a:r>
+                      <a:endParaRPr lang="ko-KR" altLang="en-US" dirty="0"/>
+                    </a:p>
+                  </a:txBody>
+                  <a:tcPr/>
+                </a:tc>
+                <a:tc>
+                  <a:txBody>
+                    <a:bodyPr/>
+                    <a:lstStyle/>
+                    <a:p>
+                      <a:pPr latinLnBrk="1"/>
+                      <a:r>
+                        <a:rPr lang="en-US" altLang="ko-KR" dirty="0" err="1"/>
+                        <a:t>nzcv</a:t>
+                      </a:r>
                       <a:endParaRPr lang="ko-KR" altLang="en-US" dirty="0"/>
                     </a:p>
                   </a:txBody>
@@ -4551,61 +4575,85 @@
                     <a:lstStyle/>
                     <a:p>
                       <a:pPr latinLnBrk="1"/>
-                      <a:endParaRPr lang="ko-KR" altLang="en-US"/>
-                    </a:p>
-                  </a:txBody>
-                  <a:tcPr/>
-                </a:tc>
-                <a:tc>
-                  <a:txBody>
-                    <a:bodyPr/>
-                    <a:lstStyle/>
-                    <a:p>
-                      <a:pPr latinLnBrk="1"/>
-                      <a:endParaRPr lang="ko-KR" altLang="en-US"/>
-                    </a:p>
-                  </a:txBody>
-                  <a:tcPr/>
-                </a:tc>
-                <a:tc>
-                  <a:txBody>
-                    <a:bodyPr/>
-                    <a:lstStyle/>
-                    <a:p>
-                      <a:pPr latinLnBrk="1"/>
-                      <a:endParaRPr lang="ko-KR" altLang="en-US"/>
-                    </a:p>
-                  </a:txBody>
-                  <a:tcPr/>
-                </a:tc>
-                <a:tc>
-                  <a:txBody>
-                    <a:bodyPr/>
-                    <a:lstStyle/>
-                    <a:p>
-                      <a:pPr latinLnBrk="1"/>
-                      <a:endParaRPr lang="ko-KR" altLang="en-US" dirty="0"/>
-                    </a:p>
-                  </a:txBody>
-                  <a:tcPr/>
-                </a:tc>
-                <a:tc>
-                  <a:txBody>
-                    <a:bodyPr/>
-                    <a:lstStyle/>
-                    <a:p>
-                      <a:pPr latinLnBrk="1"/>
-                      <a:endParaRPr lang="ko-KR" altLang="en-US" dirty="0"/>
-                    </a:p>
-                  </a:txBody>
-                  <a:tcPr/>
-                </a:tc>
-                <a:tc>
-                  <a:txBody>
-                    <a:bodyPr/>
-                    <a:lstStyle/>
-                    <a:p>
-                      <a:pPr latinLnBrk="1"/>
+                      <a:r>
+                        <a:rPr lang="en-US" altLang="ko-KR" dirty="0"/>
+                        <a:t>0xF0000000</a:t>
+                      </a:r>
+                      <a:endParaRPr lang="ko-KR" altLang="en-US" dirty="0"/>
+                    </a:p>
+                  </a:txBody>
+                  <a:tcPr/>
+                </a:tc>
+                <a:tc>
+                  <a:txBody>
+                    <a:bodyPr/>
+                    <a:lstStyle/>
+                    <a:p>
+                      <a:pPr latinLnBrk="1"/>
+                      <a:r>
+                        <a:rPr lang="en-US" altLang="ko-KR" dirty="0"/>
+                        <a:t>0x60000000</a:t>
+                      </a:r>
+                      <a:endParaRPr lang="ko-KR" altLang="en-US" dirty="0"/>
+                    </a:p>
+                  </a:txBody>
+                  <a:tcPr/>
+                </a:tc>
+                <a:tc>
+                  <a:txBody>
+                    <a:bodyPr/>
+                    <a:lstStyle/>
+                    <a:p>
+                      <a:pPr latinLnBrk="1"/>
+                      <a:r>
+                        <a:rPr lang="en-US" altLang="ko-KR" dirty="0"/>
+                        <a:t>0x50000000</a:t>
+                      </a:r>
+                      <a:endParaRPr lang="ko-KR" altLang="en-US" dirty="0"/>
+                    </a:p>
+                  </a:txBody>
+                  <a:tcPr/>
+                </a:tc>
+                <a:tc>
+                  <a:txBody>
+                    <a:bodyPr/>
+                    <a:lstStyle/>
+                    <a:p>
+                      <a:pPr latinLnBrk="1"/>
+                      <a:r>
+                        <a:rPr lang="en-US" altLang="ko-KR" dirty="0"/>
+                        <a:t>0x8</a:t>
+                      </a:r>
+                      <a:endParaRPr lang="ko-KR" altLang="en-US" dirty="0"/>
+                    </a:p>
+                  </a:txBody>
+                  <a:tcPr/>
+                </a:tc>
+                <a:tc>
+                  <a:txBody>
+                    <a:bodyPr/>
+                    <a:lstStyle/>
+                    <a:p>
+                      <a:pPr latinLnBrk="1"/>
+                      <a:r>
+                        <a:rPr lang="en-US" altLang="ko-KR" dirty="0" err="1"/>
+                        <a:t>nzcv</a:t>
+                      </a:r>
+                      <a:endParaRPr lang="ko-KR" altLang="en-US" dirty="0"/>
+                    </a:p>
+                  </a:txBody>
+                  <a:tcPr/>
+                </a:tc>
+                <a:tc>
+                  <a:txBody>
+                    <a:bodyPr/>
+                    <a:lstStyle/>
+                    <a:p>
+                      <a:pPr latinLnBrk="1"/>
+                      <a:r>
+                        <a:rPr lang="en-US" altLang="ko-KR" dirty="0" err="1"/>
+                        <a:t>nzCv</a:t>
+                      </a:r>
                       <a:endParaRPr lang="ko-KR" altLang="en-US" dirty="0"/>
                     </a:p>
                   </a:txBody>
@@ -4639,61 +4687,85 @@
                     <a:lstStyle/>
                     <a:p>
                       <a:pPr latinLnBrk="1"/>
-                      <a:endParaRPr lang="ko-KR" altLang="en-US"/>
-                    </a:p>
-                  </a:txBody>
-                  <a:tcPr/>
-                </a:tc>
-                <a:tc>
-                  <a:txBody>
-                    <a:bodyPr/>
-                    <a:lstStyle/>
-                    <a:p>
-                      <a:pPr latinLnBrk="1"/>
-                      <a:endParaRPr lang="ko-KR" altLang="en-US"/>
-                    </a:p>
-                  </a:txBody>
-                  <a:tcPr/>
-                </a:tc>
-                <a:tc>
-                  <a:txBody>
-                    <a:bodyPr/>
-                    <a:lstStyle/>
-                    <a:p>
-                      <a:pPr latinLnBrk="1"/>
-                      <a:endParaRPr lang="ko-KR" altLang="en-US"/>
-                    </a:p>
-                  </a:txBody>
-                  <a:tcPr/>
-                </a:tc>
-                <a:tc>
-                  <a:txBody>
-                    <a:bodyPr/>
-                    <a:lstStyle/>
-                    <a:p>
-                      <a:pPr latinLnBrk="1"/>
-                      <a:endParaRPr lang="ko-KR" altLang="en-US" dirty="0"/>
-                    </a:p>
-                  </a:txBody>
-                  <a:tcPr/>
-                </a:tc>
-                <a:tc>
-                  <a:txBody>
-                    <a:bodyPr/>
-                    <a:lstStyle/>
-                    <a:p>
-                      <a:pPr latinLnBrk="1"/>
-                      <a:endParaRPr lang="ko-KR" altLang="en-US" dirty="0"/>
-                    </a:p>
-                  </a:txBody>
-                  <a:tcPr/>
-                </a:tc>
-                <a:tc>
-                  <a:txBody>
-                    <a:bodyPr/>
-                    <a:lstStyle/>
-                    <a:p>
-                      <a:pPr latinLnBrk="1"/>
+                      <a:r>
+                        <a:rPr lang="en-US" altLang="ko-KR" dirty="0"/>
+                        <a:t>0xF0000000</a:t>
+                      </a:r>
+                      <a:endParaRPr lang="ko-KR" altLang="en-US" dirty="0"/>
+                    </a:p>
+                  </a:txBody>
+                  <a:tcPr/>
+                </a:tc>
+                <a:tc>
+                  <a:txBody>
+                    <a:bodyPr/>
+                    <a:lstStyle/>
+                    <a:p>
+                      <a:pPr latinLnBrk="1"/>
+                      <a:r>
+                        <a:rPr lang="en-US" altLang="ko-KR" dirty="0"/>
+                        <a:t>0x60000000</a:t>
+                      </a:r>
+                      <a:endParaRPr lang="ko-KR" altLang="en-US" dirty="0"/>
+                    </a:p>
+                  </a:txBody>
+                  <a:tcPr/>
+                </a:tc>
+                <a:tc>
+                  <a:txBody>
+                    <a:bodyPr/>
+                    <a:lstStyle/>
+                    <a:p>
+                      <a:pPr latinLnBrk="1"/>
+                      <a:r>
+                        <a:rPr lang="en-US" altLang="ko-KR" dirty="0"/>
+                        <a:t>0x50000000</a:t>
+                      </a:r>
+                      <a:endParaRPr lang="ko-KR" altLang="en-US" dirty="0"/>
+                    </a:p>
+                  </a:txBody>
+                  <a:tcPr/>
+                </a:tc>
+                <a:tc>
+                  <a:txBody>
+                    <a:bodyPr/>
+                    <a:lstStyle/>
+                    <a:p>
+                      <a:pPr latinLnBrk="1"/>
+                      <a:r>
+                        <a:rPr lang="en-US" altLang="ko-KR" dirty="0"/>
+                        <a:t>0x50000001</a:t>
+                      </a:r>
+                      <a:endParaRPr lang="ko-KR" altLang="en-US" dirty="0"/>
+                    </a:p>
+                  </a:txBody>
+                  <a:tcPr/>
+                </a:tc>
+                <a:tc>
+                  <a:txBody>
+                    <a:bodyPr/>
+                    <a:lstStyle/>
+                    <a:p>
+                      <a:pPr latinLnBrk="1"/>
+                      <a:r>
+                        <a:rPr lang="en-US" altLang="ko-KR" dirty="0" err="1"/>
+                        <a:t>nzCv</a:t>
+                      </a:r>
+                      <a:endParaRPr lang="ko-KR" altLang="en-US" dirty="0"/>
+                    </a:p>
+                  </a:txBody>
+                  <a:tcPr/>
+                </a:tc>
+                <a:tc>
+                  <a:txBody>
+                    <a:bodyPr/>
+                    <a:lstStyle/>
+                    <a:p>
+                      <a:pPr latinLnBrk="1"/>
+                      <a:r>
+                        <a:rPr lang="en-US" altLang="ko-KR" dirty="0" err="1"/>
+                        <a:t>nzCv</a:t>
+                      </a:r>
                       <a:endParaRPr lang="ko-KR" altLang="en-US" dirty="0"/>
                     </a:p>
                   </a:txBody>
@@ -4727,61 +4799,85 @@
                     <a:lstStyle/>
                     <a:p>
                       <a:pPr latinLnBrk="1"/>
-                      <a:endParaRPr lang="ko-KR" altLang="en-US"/>
-                    </a:p>
-                  </a:txBody>
-                  <a:tcPr/>
-                </a:tc>
-                <a:tc>
-                  <a:txBody>
-                    <a:bodyPr/>
-                    <a:lstStyle/>
-                    <a:p>
-                      <a:pPr latinLnBrk="1"/>
-                      <a:endParaRPr lang="ko-KR" altLang="en-US"/>
-                    </a:p>
-                  </a:txBody>
-                  <a:tcPr/>
-                </a:tc>
-                <a:tc>
-                  <a:txBody>
-                    <a:bodyPr/>
-                    <a:lstStyle/>
-                    <a:p>
-                      <a:pPr latinLnBrk="1"/>
-                      <a:endParaRPr lang="ko-KR" altLang="en-US"/>
-                    </a:p>
-                  </a:txBody>
-                  <a:tcPr/>
-                </a:tc>
-                <a:tc>
-                  <a:txBody>
-                    <a:bodyPr/>
-                    <a:lstStyle/>
-                    <a:p>
-                      <a:pPr latinLnBrk="1"/>
-                      <a:endParaRPr lang="ko-KR" altLang="en-US" dirty="0"/>
-                    </a:p>
-                  </a:txBody>
-                  <a:tcPr/>
-                </a:tc>
-                <a:tc>
-                  <a:txBody>
-                    <a:bodyPr/>
-                    <a:lstStyle/>
-                    <a:p>
-                      <a:pPr latinLnBrk="1"/>
-                      <a:endParaRPr lang="ko-KR" altLang="en-US" dirty="0"/>
-                    </a:p>
-                  </a:txBody>
-                  <a:tcPr/>
-                </a:tc>
-                <a:tc>
-                  <a:txBody>
-                    <a:bodyPr/>
-                    <a:lstStyle/>
-                    <a:p>
-                      <a:pPr latinLnBrk="1"/>
+                      <a:r>
+                        <a:rPr lang="en-US" altLang="ko-KR" dirty="0"/>
+                        <a:t>0xF0000000</a:t>
+                      </a:r>
+                      <a:endParaRPr lang="ko-KR" altLang="en-US" dirty="0"/>
+                    </a:p>
+                  </a:txBody>
+                  <a:tcPr/>
+                </a:tc>
+                <a:tc>
+                  <a:txBody>
+                    <a:bodyPr/>
+                    <a:lstStyle/>
+                    <a:p>
+                      <a:pPr latinLnBrk="1"/>
+                      <a:r>
+                        <a:rPr lang="en-US" altLang="ko-KR" dirty="0"/>
+                        <a:t>0x60000000</a:t>
+                      </a:r>
+                      <a:endParaRPr lang="ko-KR" altLang="en-US" dirty="0"/>
+                    </a:p>
+                  </a:txBody>
+                  <a:tcPr/>
+                </a:tc>
+                <a:tc>
+                  <a:txBody>
+                    <a:bodyPr/>
+                    <a:lstStyle/>
+                    <a:p>
+                      <a:pPr latinLnBrk="1"/>
+                      <a:r>
+                        <a:rPr lang="en-US" altLang="ko-KR" dirty="0"/>
+                        <a:t>0x90000000</a:t>
+                      </a:r>
+                      <a:endParaRPr lang="ko-KR" altLang="en-US" dirty="0"/>
+                    </a:p>
+                  </a:txBody>
+                  <a:tcPr/>
+                </a:tc>
+                <a:tc>
+                  <a:txBody>
+                    <a:bodyPr/>
+                    <a:lstStyle/>
+                    <a:p>
+                      <a:pPr latinLnBrk="1"/>
+                      <a:r>
+                        <a:rPr lang="en-US" altLang="ko-KR" dirty="0"/>
+                        <a:t>0x50000001</a:t>
+                      </a:r>
+                      <a:endParaRPr lang="ko-KR" altLang="en-US" dirty="0"/>
+                    </a:p>
+                  </a:txBody>
+                  <a:tcPr/>
+                </a:tc>
+                <a:tc>
+                  <a:txBody>
+                    <a:bodyPr/>
+                    <a:lstStyle/>
+                    <a:p>
+                      <a:pPr latinLnBrk="1"/>
+                      <a:r>
+                        <a:rPr lang="en-US" altLang="ko-KR" dirty="0" err="1"/>
+                        <a:t>nzCv</a:t>
+                      </a:r>
+                      <a:endParaRPr lang="ko-KR" altLang="en-US" dirty="0"/>
+                    </a:p>
+                  </a:txBody>
+                  <a:tcPr/>
+                </a:tc>
+                <a:tc>
+                  <a:txBody>
+                    <a:bodyPr/>
+                    <a:lstStyle/>
+                    <a:p>
+                      <a:pPr latinLnBrk="1"/>
+                      <a:r>
+                        <a:rPr lang="en-US" altLang="ko-KR" dirty="0" err="1"/>
+                        <a:t>NzCv</a:t>
+                      </a:r>
                       <a:endParaRPr lang="ko-KR" altLang="en-US" dirty="0"/>
                     </a:p>
                   </a:txBody>
@@ -4815,61 +4911,85 @@
                     <a:lstStyle/>
                     <a:p>
                       <a:pPr latinLnBrk="1"/>
-                      <a:endParaRPr lang="ko-KR" altLang="en-US"/>
-                    </a:p>
-                  </a:txBody>
-                  <a:tcPr/>
-                </a:tc>
-                <a:tc>
-                  <a:txBody>
-                    <a:bodyPr/>
-                    <a:lstStyle/>
-                    <a:p>
-                      <a:pPr latinLnBrk="1"/>
-                      <a:endParaRPr lang="ko-KR" altLang="en-US"/>
-                    </a:p>
-                  </a:txBody>
-                  <a:tcPr/>
-                </a:tc>
-                <a:tc>
-                  <a:txBody>
-                    <a:bodyPr/>
-                    <a:lstStyle/>
-                    <a:p>
-                      <a:pPr latinLnBrk="1"/>
-                      <a:endParaRPr lang="ko-KR" altLang="en-US"/>
-                    </a:p>
-                  </a:txBody>
-                  <a:tcPr/>
-                </a:tc>
-                <a:tc>
-                  <a:txBody>
-                    <a:bodyPr/>
-                    <a:lstStyle/>
-                    <a:p>
-                      <a:pPr latinLnBrk="1"/>
-                      <a:endParaRPr lang="ko-KR" altLang="en-US" dirty="0"/>
-                    </a:p>
-                  </a:txBody>
-                  <a:tcPr/>
-                </a:tc>
-                <a:tc>
-                  <a:txBody>
-                    <a:bodyPr/>
-                    <a:lstStyle/>
-                    <a:p>
-                      <a:pPr latinLnBrk="1"/>
-                      <a:endParaRPr lang="ko-KR" altLang="en-US" dirty="0"/>
-                    </a:p>
-                  </a:txBody>
-                  <a:tcPr/>
-                </a:tc>
-                <a:tc>
-                  <a:txBody>
-                    <a:bodyPr/>
-                    <a:lstStyle/>
-                    <a:p>
-                      <a:pPr latinLnBrk="1"/>
+                      <a:r>
+                        <a:rPr lang="en-US" altLang="ko-KR" dirty="0"/>
+                        <a:t>0xF0000000</a:t>
+                      </a:r>
+                      <a:endParaRPr lang="ko-KR" altLang="en-US" dirty="0"/>
+                    </a:p>
+                  </a:txBody>
+                  <a:tcPr/>
+                </a:tc>
+                <a:tc>
+                  <a:txBody>
+                    <a:bodyPr/>
+                    <a:lstStyle/>
+                    <a:p>
+                      <a:pPr latinLnBrk="1"/>
+                      <a:r>
+                        <a:rPr lang="en-US" altLang="ko-KR" dirty="0"/>
+                        <a:t>0x60000000</a:t>
+                      </a:r>
+                      <a:endParaRPr lang="ko-KR" altLang="en-US" dirty="0"/>
+                    </a:p>
+                  </a:txBody>
+                  <a:tcPr/>
+                </a:tc>
+                <a:tc>
+                  <a:txBody>
+                    <a:bodyPr/>
+                    <a:lstStyle/>
+                    <a:p>
+                      <a:pPr latinLnBrk="1"/>
+                      <a:r>
+                        <a:rPr lang="en-US" altLang="ko-KR" dirty="0"/>
+                        <a:t>0x90000000</a:t>
+                      </a:r>
+                      <a:endParaRPr lang="ko-KR" altLang="en-US" dirty="0"/>
+                    </a:p>
+                  </a:txBody>
+                  <a:tcPr/>
+                </a:tc>
+                <a:tc>
+                  <a:txBody>
+                    <a:bodyPr/>
+                    <a:lstStyle/>
+                    <a:p>
+                      <a:pPr latinLnBrk="1"/>
+                      <a:r>
+                        <a:rPr lang="en-US" altLang="ko-KR" dirty="0"/>
+                        <a:t>0x90000000</a:t>
+                      </a:r>
+                      <a:endParaRPr lang="ko-KR" altLang="en-US" dirty="0"/>
+                    </a:p>
+                  </a:txBody>
+                  <a:tcPr/>
+                </a:tc>
+                <a:tc>
+                  <a:txBody>
+                    <a:bodyPr/>
+                    <a:lstStyle/>
+                    <a:p>
+                      <a:pPr latinLnBrk="1"/>
+                      <a:r>
+                        <a:rPr lang="en-US" altLang="ko-KR" dirty="0" err="1"/>
+                        <a:t>NzCv</a:t>
+                      </a:r>
+                      <a:endParaRPr lang="ko-KR" altLang="en-US" dirty="0"/>
+                    </a:p>
+                  </a:txBody>
+                  <a:tcPr/>
+                </a:tc>
+                <a:tc>
+                  <a:txBody>
+                    <a:bodyPr/>
+                    <a:lstStyle/>
+                    <a:p>
+                      <a:pPr latinLnBrk="1"/>
+                      <a:r>
+                        <a:rPr lang="en-US" altLang="ko-KR" dirty="0" err="1"/>
+                        <a:t>NzCv</a:t>
+                      </a:r>
                       <a:endParaRPr lang="ko-KR" altLang="en-US" dirty="0"/>
                     </a:p>
                   </a:txBody>
@@ -4890,74 +5010,98 @@
                       <a:pPr latinLnBrk="1"/>
                       <a:r>
                         <a:rPr lang="en-US" altLang="ko-KR" dirty="0"/>
-                        <a:t>RSB R5, R3, #1</a:t>
-                      </a:r>
-                      <a:endParaRPr lang="ko-KR" altLang="en-US" dirty="0"/>
-                    </a:p>
-                  </a:txBody>
-                  <a:tcPr/>
-                </a:tc>
-                <a:tc>
-                  <a:txBody>
-                    <a:bodyPr/>
-                    <a:lstStyle/>
-                    <a:p>
-                      <a:pPr latinLnBrk="1"/>
-                      <a:endParaRPr lang="ko-KR" altLang="en-US" dirty="0"/>
-                    </a:p>
-                  </a:txBody>
-                  <a:tcPr/>
-                </a:tc>
-                <a:tc>
-                  <a:txBody>
-                    <a:bodyPr/>
-                    <a:lstStyle/>
-                    <a:p>
-                      <a:pPr latinLnBrk="1"/>
-                      <a:endParaRPr lang="ko-KR" altLang="en-US" dirty="0"/>
-                    </a:p>
-                  </a:txBody>
-                  <a:tcPr/>
-                </a:tc>
-                <a:tc>
-                  <a:txBody>
-                    <a:bodyPr/>
-                    <a:lstStyle/>
-                    <a:p>
-                      <a:pPr latinLnBrk="1"/>
-                      <a:endParaRPr lang="ko-KR" altLang="en-US" dirty="0"/>
-                    </a:p>
-                  </a:txBody>
-                  <a:tcPr/>
-                </a:tc>
-                <a:tc>
-                  <a:txBody>
-                    <a:bodyPr/>
-                    <a:lstStyle/>
-                    <a:p>
-                      <a:pPr latinLnBrk="1"/>
-                      <a:endParaRPr lang="ko-KR" altLang="en-US" dirty="0"/>
-                    </a:p>
-                  </a:txBody>
-                  <a:tcPr/>
-                </a:tc>
-                <a:tc>
-                  <a:txBody>
-                    <a:bodyPr/>
-                    <a:lstStyle/>
-                    <a:p>
-                      <a:pPr latinLnBrk="1"/>
-                      <a:endParaRPr lang="ko-KR" altLang="en-US" dirty="0"/>
-                    </a:p>
-                  </a:txBody>
-                  <a:tcPr/>
-                </a:tc>
-                <a:tc>
-                  <a:txBody>
-                    <a:bodyPr/>
-                    <a:lstStyle/>
-                    <a:p>
-                      <a:pPr latinLnBrk="1"/>
+                        <a:t>RSBS R5, R3, #1</a:t>
+                      </a:r>
+                      <a:endParaRPr lang="ko-KR" altLang="en-US" dirty="0"/>
+                    </a:p>
+                  </a:txBody>
+                  <a:tcPr/>
+                </a:tc>
+                <a:tc>
+                  <a:txBody>
+                    <a:bodyPr/>
+                    <a:lstStyle/>
+                    <a:p>
+                      <a:pPr latinLnBrk="1"/>
+                      <a:r>
+                        <a:rPr lang="en-US" altLang="ko-KR" dirty="0"/>
+                        <a:t>0xF0000000</a:t>
+                      </a:r>
+                      <a:endParaRPr lang="ko-KR" altLang="en-US" dirty="0"/>
+                    </a:p>
+                  </a:txBody>
+                  <a:tcPr/>
+                </a:tc>
+                <a:tc>
+                  <a:txBody>
+                    <a:bodyPr/>
+                    <a:lstStyle/>
+                    <a:p>
+                      <a:pPr latinLnBrk="1"/>
+                      <a:r>
+                        <a:rPr lang="en-US" altLang="ko-KR" dirty="0"/>
+                        <a:t>0x60000000</a:t>
+                      </a:r>
+                      <a:endParaRPr lang="ko-KR" altLang="en-US" dirty="0"/>
+                    </a:p>
+                  </a:txBody>
+                  <a:tcPr/>
+                </a:tc>
+                <a:tc>
+                  <a:txBody>
+                    <a:bodyPr/>
+                    <a:lstStyle/>
+                    <a:p>
+                      <a:pPr latinLnBrk="1"/>
+                      <a:r>
+                        <a:rPr lang="en-US" altLang="ko-KR" dirty="0"/>
+                        <a:t>0x10000001</a:t>
+                      </a:r>
+                      <a:endParaRPr lang="ko-KR" altLang="en-US" dirty="0"/>
+                    </a:p>
+                  </a:txBody>
+                  <a:tcPr/>
+                </a:tc>
+                <a:tc>
+                  <a:txBody>
+                    <a:bodyPr/>
+                    <a:lstStyle/>
+                    <a:p>
+                      <a:pPr latinLnBrk="1"/>
+                      <a:r>
+                        <a:rPr lang="en-US" altLang="ko-KR" dirty="0"/>
+                        <a:t>0x90000000</a:t>
+                      </a:r>
+                      <a:endParaRPr lang="ko-KR" altLang="en-US" dirty="0"/>
+                    </a:p>
+                  </a:txBody>
+                  <a:tcPr/>
+                </a:tc>
+                <a:tc>
+                  <a:txBody>
+                    <a:bodyPr/>
+                    <a:lstStyle/>
+                    <a:p>
+                      <a:pPr latinLnBrk="1"/>
+                      <a:r>
+                        <a:rPr lang="en-US" altLang="ko-KR" dirty="0" err="1"/>
+                        <a:t>nzcv</a:t>
+                      </a:r>
+                      <a:endParaRPr lang="ko-KR" altLang="en-US" dirty="0"/>
+                    </a:p>
+                  </a:txBody>
+                  <a:tcPr/>
+                </a:tc>
+                <a:tc>
+                  <a:txBody>
+                    <a:bodyPr/>
+                    <a:lstStyle/>
+                    <a:p>
+                      <a:pPr latinLnBrk="1"/>
+                      <a:r>
+                        <a:rPr lang="en-US" altLang="ko-KR" dirty="0" err="1"/>
+                        <a:t>nzcv</a:t>
+                      </a:r>
                       <a:endParaRPr lang="ko-KR" altLang="en-US" dirty="0"/>
                     </a:p>
                   </a:txBody>
@@ -4991,61 +5135,85 @@
                     <a:lstStyle/>
                     <a:p>
                       <a:pPr latinLnBrk="1"/>
-                      <a:endParaRPr lang="ko-KR" altLang="en-US" dirty="0"/>
-                    </a:p>
-                  </a:txBody>
-                  <a:tcPr/>
-                </a:tc>
-                <a:tc>
-                  <a:txBody>
-                    <a:bodyPr/>
-                    <a:lstStyle/>
-                    <a:p>
-                      <a:pPr latinLnBrk="1"/>
-                      <a:endParaRPr lang="ko-KR" altLang="en-US" dirty="0"/>
-                    </a:p>
-                  </a:txBody>
-                  <a:tcPr/>
-                </a:tc>
-                <a:tc>
-                  <a:txBody>
-                    <a:bodyPr/>
-                    <a:lstStyle/>
-                    <a:p>
-                      <a:pPr latinLnBrk="1"/>
-                      <a:endParaRPr lang="ko-KR" altLang="en-US" dirty="0"/>
-                    </a:p>
-                  </a:txBody>
-                  <a:tcPr/>
-                </a:tc>
-                <a:tc>
-                  <a:txBody>
-                    <a:bodyPr/>
-                    <a:lstStyle/>
-                    <a:p>
-                      <a:pPr latinLnBrk="1"/>
-                      <a:endParaRPr lang="ko-KR" altLang="en-US" dirty="0"/>
-                    </a:p>
-                  </a:txBody>
-                  <a:tcPr/>
-                </a:tc>
-                <a:tc>
-                  <a:txBody>
-                    <a:bodyPr/>
-                    <a:lstStyle/>
-                    <a:p>
-                      <a:pPr latinLnBrk="1"/>
-                      <a:endParaRPr lang="ko-KR" altLang="en-US" dirty="0"/>
-                    </a:p>
-                  </a:txBody>
-                  <a:tcPr/>
-                </a:tc>
-                <a:tc>
-                  <a:txBody>
-                    <a:bodyPr/>
-                    <a:lstStyle/>
-                    <a:p>
-                      <a:pPr latinLnBrk="1"/>
+                      <a:r>
+                        <a:rPr lang="en-US" altLang="ko-KR" dirty="0"/>
+                        <a:t>0xF0000000</a:t>
+                      </a:r>
+                      <a:endParaRPr lang="ko-KR" altLang="en-US" dirty="0"/>
+                    </a:p>
+                  </a:txBody>
+                  <a:tcPr/>
+                </a:tc>
+                <a:tc>
+                  <a:txBody>
+                    <a:bodyPr/>
+                    <a:lstStyle/>
+                    <a:p>
+                      <a:pPr latinLnBrk="1"/>
+                      <a:r>
+                        <a:rPr lang="en-US" altLang="ko-KR" dirty="0"/>
+                        <a:t>0x60000000</a:t>
+                      </a:r>
+                      <a:endParaRPr lang="ko-KR" altLang="en-US" dirty="0"/>
+                    </a:p>
+                  </a:txBody>
+                  <a:tcPr/>
+                </a:tc>
+                <a:tc>
+                  <a:txBody>
+                    <a:bodyPr/>
+                    <a:lstStyle/>
+                    <a:p>
+                      <a:pPr latinLnBrk="1"/>
+                      <a:r>
+                        <a:rPr lang="en-US" altLang="ko-KR" dirty="0"/>
+                        <a:t>0x10000001</a:t>
+                      </a:r>
+                      <a:endParaRPr lang="ko-KR" altLang="en-US" dirty="0"/>
+                    </a:p>
+                  </a:txBody>
+                  <a:tcPr/>
+                </a:tc>
+                <a:tc>
+                  <a:txBody>
+                    <a:bodyPr/>
+                    <a:lstStyle/>
+                    <a:p>
+                      <a:pPr latinLnBrk="1"/>
+                      <a:r>
+                        <a:rPr lang="en-US" altLang="ko-KR" dirty="0"/>
+                        <a:t>0x10000000</a:t>
+                      </a:r>
+                      <a:endParaRPr lang="ko-KR" altLang="en-US" dirty="0"/>
+                    </a:p>
+                  </a:txBody>
+                  <a:tcPr/>
+                </a:tc>
+                <a:tc>
+                  <a:txBody>
+                    <a:bodyPr/>
+                    <a:lstStyle/>
+                    <a:p>
+                      <a:pPr latinLnBrk="1"/>
+                      <a:r>
+                        <a:rPr lang="en-US" altLang="ko-KR" dirty="0" err="1"/>
+                        <a:t>nzcv</a:t>
+                      </a:r>
+                      <a:endParaRPr lang="ko-KR" altLang="en-US" dirty="0"/>
+                    </a:p>
+                  </a:txBody>
+                  <a:tcPr/>
+                </a:tc>
+                <a:tc>
+                  <a:txBody>
+                    <a:bodyPr/>
+                    <a:lstStyle/>
+                    <a:p>
+                      <a:pPr latinLnBrk="1"/>
+                      <a:r>
+                        <a:rPr lang="en-US" altLang="ko-KR" dirty="0" err="1"/>
+                        <a:t>nzcv</a:t>
+                      </a:r>
                       <a:endParaRPr lang="ko-KR" altLang="en-US" dirty="0"/>
                     </a:p>
                   </a:txBody>
@@ -5083,61 +5251,85 @@
                     <a:lstStyle/>
                     <a:p>
                       <a:pPr latinLnBrk="1"/>
-                      <a:endParaRPr lang="ko-KR" altLang="en-US" dirty="0"/>
-                    </a:p>
-                  </a:txBody>
-                  <a:tcPr/>
-                </a:tc>
-                <a:tc>
-                  <a:txBody>
-                    <a:bodyPr/>
-                    <a:lstStyle/>
-                    <a:p>
-                      <a:pPr latinLnBrk="1"/>
-                      <a:endParaRPr lang="ko-KR" altLang="en-US" dirty="0"/>
-                    </a:p>
-                  </a:txBody>
-                  <a:tcPr/>
-                </a:tc>
-                <a:tc>
-                  <a:txBody>
-                    <a:bodyPr/>
-                    <a:lstStyle/>
-                    <a:p>
-                      <a:pPr latinLnBrk="1"/>
-                      <a:endParaRPr lang="ko-KR" altLang="en-US" dirty="0"/>
-                    </a:p>
-                  </a:txBody>
-                  <a:tcPr/>
-                </a:tc>
-                <a:tc>
-                  <a:txBody>
-                    <a:bodyPr/>
-                    <a:lstStyle/>
-                    <a:p>
-                      <a:pPr latinLnBrk="1"/>
-                      <a:endParaRPr lang="ko-KR" altLang="en-US" dirty="0"/>
-                    </a:p>
-                  </a:txBody>
-                  <a:tcPr/>
-                </a:tc>
-                <a:tc>
-                  <a:txBody>
-                    <a:bodyPr/>
-                    <a:lstStyle/>
-                    <a:p>
-                      <a:pPr latinLnBrk="1"/>
-                      <a:endParaRPr lang="ko-KR" altLang="en-US" dirty="0"/>
-                    </a:p>
-                  </a:txBody>
-                  <a:tcPr/>
-                </a:tc>
-                <a:tc>
-                  <a:txBody>
-                    <a:bodyPr/>
-                    <a:lstStyle/>
-                    <a:p>
-                      <a:pPr latinLnBrk="1"/>
+                      <a:r>
+                        <a:rPr lang="en-US" altLang="ko-KR" dirty="0"/>
+                        <a:t>0x5</a:t>
+                      </a:r>
+                      <a:endParaRPr lang="ko-KR" altLang="en-US" dirty="0"/>
+                    </a:p>
+                  </a:txBody>
+                  <a:tcPr/>
+                </a:tc>
+                <a:tc>
+                  <a:txBody>
+                    <a:bodyPr/>
+                    <a:lstStyle/>
+                    <a:p>
+                      <a:pPr latinLnBrk="1"/>
+                      <a:r>
+                        <a:rPr lang="en-US" altLang="ko-KR" dirty="0"/>
+                        <a:t>0x60000000</a:t>
+                      </a:r>
+                      <a:endParaRPr lang="ko-KR" altLang="en-US" dirty="0"/>
+                    </a:p>
+                  </a:txBody>
+                  <a:tcPr/>
+                </a:tc>
+                <a:tc>
+                  <a:txBody>
+                    <a:bodyPr/>
+                    <a:lstStyle/>
+                    <a:p>
+                      <a:pPr latinLnBrk="1"/>
+                      <a:r>
+                        <a:rPr lang="en-US" altLang="ko-KR" dirty="0"/>
+                        <a:t>0x19</a:t>
+                      </a:r>
+                      <a:endParaRPr lang="ko-KR" altLang="en-US" dirty="0"/>
+                    </a:p>
+                  </a:txBody>
+                  <a:tcPr/>
+                </a:tc>
+                <a:tc>
+                  <a:txBody>
+                    <a:bodyPr/>
+                    <a:lstStyle/>
+                    <a:p>
+                      <a:pPr latinLnBrk="1"/>
+                      <a:r>
+                        <a:rPr lang="en-US" altLang="ko-KR" dirty="0"/>
+                        <a:t>0x10000000</a:t>
+                      </a:r>
+                      <a:endParaRPr lang="ko-KR" altLang="en-US" dirty="0"/>
+                    </a:p>
+                  </a:txBody>
+                  <a:tcPr/>
+                </a:tc>
+                <a:tc>
+                  <a:txBody>
+                    <a:bodyPr/>
+                    <a:lstStyle/>
+                    <a:p>
+                      <a:pPr latinLnBrk="1"/>
+                      <a:r>
+                        <a:rPr lang="en-US" altLang="ko-KR" dirty="0" err="1"/>
+                        <a:t>nzcv</a:t>
+                      </a:r>
+                      <a:endParaRPr lang="ko-KR" altLang="en-US" dirty="0"/>
+                    </a:p>
+                  </a:txBody>
+                  <a:tcPr/>
+                </a:tc>
+                <a:tc>
+                  <a:txBody>
+                    <a:bodyPr/>
+                    <a:lstStyle/>
+                    <a:p>
+                      <a:pPr latinLnBrk="1"/>
+                      <a:r>
+                        <a:rPr lang="en-US" altLang="ko-KR" dirty="0" err="1"/>
+                        <a:t>nzcv</a:t>
+                      </a:r>
                       <a:endParaRPr lang="ko-KR" altLang="en-US" dirty="0"/>
                     </a:p>
                   </a:txBody>
@@ -5171,61 +5363,85 @@
                     <a:lstStyle/>
                     <a:p>
                       <a:pPr latinLnBrk="1"/>
-                      <a:endParaRPr lang="ko-KR" altLang="en-US" dirty="0"/>
-                    </a:p>
-                  </a:txBody>
-                  <a:tcPr/>
-                </a:tc>
-                <a:tc>
-                  <a:txBody>
-                    <a:bodyPr/>
-                    <a:lstStyle/>
-                    <a:p>
-                      <a:pPr latinLnBrk="1"/>
-                      <a:endParaRPr lang="ko-KR" altLang="en-US" dirty="0"/>
-                    </a:p>
-                  </a:txBody>
-                  <a:tcPr/>
-                </a:tc>
-                <a:tc>
-                  <a:txBody>
-                    <a:bodyPr/>
-                    <a:lstStyle/>
-                    <a:p>
-                      <a:pPr latinLnBrk="1"/>
-                      <a:endParaRPr lang="ko-KR" altLang="en-US" dirty="0"/>
-                    </a:p>
-                  </a:txBody>
-                  <a:tcPr/>
-                </a:tc>
-                <a:tc>
-                  <a:txBody>
-                    <a:bodyPr/>
-                    <a:lstStyle/>
-                    <a:p>
-                      <a:pPr latinLnBrk="1"/>
-                      <a:endParaRPr lang="ko-KR" altLang="en-US" dirty="0"/>
-                    </a:p>
-                  </a:txBody>
-                  <a:tcPr/>
-                </a:tc>
-                <a:tc>
-                  <a:txBody>
-                    <a:bodyPr/>
-                    <a:lstStyle/>
-                    <a:p>
-                      <a:pPr latinLnBrk="1"/>
-                      <a:endParaRPr lang="ko-KR" altLang="en-US" dirty="0"/>
-                    </a:p>
-                  </a:txBody>
-                  <a:tcPr/>
-                </a:tc>
-                <a:tc>
-                  <a:txBody>
-                    <a:bodyPr/>
-                    <a:lstStyle/>
-                    <a:p>
-                      <a:pPr latinLnBrk="1"/>
+                      <a:r>
+                        <a:rPr lang="en-US" altLang="ko-KR" dirty="0"/>
+                        <a:t>0x5</a:t>
+                      </a:r>
+                      <a:endParaRPr lang="ko-KR" altLang="en-US" dirty="0"/>
+                    </a:p>
+                  </a:txBody>
+                  <a:tcPr/>
+                </a:tc>
+                <a:tc>
+                  <a:txBody>
+                    <a:bodyPr/>
+                    <a:lstStyle/>
+                    <a:p>
+                      <a:pPr latinLnBrk="1"/>
+                      <a:r>
+                        <a:rPr lang="en-US" altLang="ko-KR" dirty="0"/>
+                        <a:t>0x60000000</a:t>
+                      </a:r>
+                      <a:endParaRPr lang="ko-KR" altLang="en-US" dirty="0"/>
+                    </a:p>
+                  </a:txBody>
+                  <a:tcPr/>
+                </a:tc>
+                <a:tc>
+                  <a:txBody>
+                    <a:bodyPr/>
+                    <a:lstStyle/>
+                    <a:p>
+                      <a:pPr latinLnBrk="1"/>
+                      <a:r>
+                        <a:rPr lang="en-US" altLang="ko-KR" dirty="0"/>
+                        <a:t>0x19</a:t>
+                      </a:r>
+                      <a:endParaRPr lang="ko-KR" altLang="en-US" dirty="0"/>
+                    </a:p>
+                  </a:txBody>
+                  <a:tcPr/>
+                </a:tc>
+                <a:tc>
+                  <a:txBody>
+                    <a:bodyPr/>
+                    <a:lstStyle/>
+                    <a:p>
+                      <a:pPr latinLnBrk="1"/>
+                      <a:r>
+                        <a:rPr lang="en-US" altLang="ko-KR" dirty="0"/>
+                        <a:t>0xAF</a:t>
+                      </a:r>
+                      <a:endParaRPr lang="ko-KR" altLang="en-US" dirty="0"/>
+                    </a:p>
+                  </a:txBody>
+                  <a:tcPr/>
+                </a:tc>
+                <a:tc>
+                  <a:txBody>
+                    <a:bodyPr/>
+                    <a:lstStyle/>
+                    <a:p>
+                      <a:pPr latinLnBrk="1"/>
+                      <a:r>
+                        <a:rPr lang="en-US" altLang="ko-KR" dirty="0" err="1"/>
+                        <a:t>nzcv</a:t>
+                      </a:r>
+                      <a:endParaRPr lang="ko-KR" altLang="en-US" dirty="0"/>
+                    </a:p>
+                  </a:txBody>
+                  <a:tcPr/>
+                </a:tc>
+                <a:tc>
+                  <a:txBody>
+                    <a:bodyPr/>
+                    <a:lstStyle/>
+                    <a:p>
+                      <a:pPr latinLnBrk="1"/>
+                      <a:r>
+                        <a:rPr lang="en-US" altLang="ko-KR" dirty="0" err="1"/>
+                        <a:t>nzcv</a:t>
+                      </a:r>
                       <a:endParaRPr lang="ko-KR" altLang="en-US" dirty="0"/>
                     </a:p>
                   </a:txBody>
@@ -5602,7 +5818,7 @@
           <p:nvPr>
             <p:extLst>
               <p:ext uri="{D42A27DB-BD31-4B8C-83A1-F6EECF244321}">
-                <p14:modId xmlns:p14="http://schemas.microsoft.com/office/powerpoint/2010/main" val="3700925524"/>
+                <p14:modId xmlns:p14="http://schemas.microsoft.com/office/powerpoint/2010/main" val="793549855"/>
               </p:ext>
             </p:extLst>
           </p:nvPr>
@@ -5710,17 +5926,25 @@
                     <a:lstStyle/>
                     <a:p>
                       <a:pPr latinLnBrk="1"/>
-                      <a:endParaRPr lang="ko-KR" altLang="en-US" dirty="0"/>
-                    </a:p>
-                  </a:txBody>
-                  <a:tcPr/>
-                </a:tc>
-                <a:tc>
-                  <a:txBody>
-                    <a:bodyPr/>
-                    <a:lstStyle/>
-                    <a:p>
-                      <a:pPr latinLnBrk="1"/>
+                      <a:r>
+                        <a:rPr lang="en-US" altLang="ko-KR" dirty="0"/>
+                        <a:t>0x0</a:t>
+                      </a:r>
+                      <a:endParaRPr lang="ko-KR" altLang="en-US" dirty="0"/>
+                    </a:p>
+                  </a:txBody>
+                  <a:tcPr/>
+                </a:tc>
+                <a:tc>
+                  <a:txBody>
+                    <a:bodyPr/>
+                    <a:lstStyle/>
+                    <a:p>
+                      <a:pPr latinLnBrk="1"/>
+                      <a:r>
+                        <a:rPr lang="en-US" altLang="ko-KR" dirty="0"/>
+                        <a:t>0x00000f00</a:t>
+                      </a:r>
                       <a:endParaRPr lang="ko-KR" altLang="en-US" dirty="0"/>
                     </a:p>
                   </a:txBody>
@@ -5754,17 +5978,25 @@
                     <a:lstStyle/>
                     <a:p>
                       <a:pPr latinLnBrk="1"/>
-                      <a:endParaRPr lang="ko-KR" altLang="en-US"/>
-                    </a:p>
-                  </a:txBody>
-                  <a:tcPr/>
-                </a:tc>
-                <a:tc>
-                  <a:txBody>
-                    <a:bodyPr/>
-                    <a:lstStyle/>
-                    <a:p>
-                      <a:pPr latinLnBrk="1"/>
+                      <a:r>
+                        <a:rPr lang="en-US" altLang="ko-KR" dirty="0"/>
+                        <a:t>0x00000f00</a:t>
+                      </a:r>
+                      <a:endParaRPr lang="ko-KR" altLang="en-US" dirty="0"/>
+                    </a:p>
+                  </a:txBody>
+                  <a:tcPr/>
+                </a:tc>
+                <a:tc>
+                  <a:txBody>
+                    <a:bodyPr/>
+                    <a:lstStyle/>
+                    <a:p>
+                      <a:pPr latinLnBrk="1"/>
+                      <a:r>
+                        <a:rPr lang="en-US" altLang="ko-KR" dirty="0"/>
+                        <a:t>0x00000f09</a:t>
+                      </a:r>
                       <a:endParaRPr lang="ko-KR" altLang="en-US" dirty="0"/>
                     </a:p>
                   </a:txBody>
@@ -6270,14 +6502,14 @@
           <p:nvPr>
             <p:extLst>
               <p:ext uri="{D42A27DB-BD31-4B8C-83A1-F6EECF244321}">
-                <p14:modId xmlns:p14="http://schemas.microsoft.com/office/powerpoint/2010/main" val="311116514"/>
+                <p14:modId xmlns:p14="http://schemas.microsoft.com/office/powerpoint/2010/main" val="4178484213"/>
               </p:ext>
             </p:extLst>
           </p:nvPr>
         </p:nvGraphicFramePr>
         <p:xfrm>
           <a:off x="914399" y="3005707"/>
-          <a:ext cx="10699845" cy="3443933"/>
+          <a:ext cx="10699845" cy="4914089"/>
         </p:xfrm>
         <a:graphic>
           <a:graphicData uri="http://schemas.openxmlformats.org/drawingml/2006/table">
@@ -6444,50 +6676,70 @@
                     <a:lstStyle/>
                     <a:p>
                       <a:pPr latinLnBrk="1"/>
-                      <a:endParaRPr lang="ko-KR" altLang="en-US" dirty="0"/>
-                    </a:p>
-                  </a:txBody>
-                  <a:tcPr/>
-                </a:tc>
-                <a:tc>
-                  <a:txBody>
-                    <a:bodyPr/>
-                    <a:lstStyle/>
-                    <a:p>
-                      <a:pPr latinLnBrk="1"/>
-                      <a:endParaRPr lang="ko-KR" altLang="en-US"/>
-                    </a:p>
-                  </a:txBody>
-                  <a:tcPr/>
-                </a:tc>
-                <a:tc>
-                  <a:txBody>
-                    <a:bodyPr/>
-                    <a:lstStyle/>
-                    <a:p>
-                      <a:pPr latinLnBrk="1"/>
-                      <a:endParaRPr lang="ko-KR" altLang="en-US"/>
-                    </a:p>
-                  </a:txBody>
-                  <a:tcPr/>
-                </a:tc>
-                <a:tc>
-                  <a:txBody>
-                    <a:bodyPr/>
-                    <a:lstStyle/>
-                    <a:p>
-                      <a:pPr latinLnBrk="1"/>
-                      <a:endParaRPr lang="ko-KR" altLang="en-US" dirty="0"/>
-                    </a:p>
-                  </a:txBody>
-                  <a:tcPr/>
-                </a:tc>
-                <a:tc>
-                  <a:txBody>
-                    <a:bodyPr/>
-                    <a:lstStyle/>
-                    <a:p>
-                      <a:pPr latinLnBrk="1"/>
+                      <a:r>
+                        <a:rPr lang="en-US" altLang="ko-KR" dirty="0"/>
+                        <a:t>0x00000030</a:t>
+                      </a:r>
+                      <a:endParaRPr lang="ko-KR" altLang="en-US" dirty="0"/>
+                    </a:p>
+                  </a:txBody>
+                  <a:tcPr/>
+                </a:tc>
+                <a:tc>
+                  <a:txBody>
+                    <a:bodyPr/>
+                    <a:lstStyle/>
+                    <a:p>
+                      <a:pPr latinLnBrk="1"/>
+                      <a:r>
+                        <a:rPr lang="en-US" altLang="ko-KR" dirty="0"/>
+                        <a:t>0x00000050</a:t>
+                      </a:r>
+                      <a:endParaRPr lang="ko-KR" altLang="en-US" dirty="0"/>
+                    </a:p>
+                  </a:txBody>
+                  <a:tcPr/>
+                </a:tc>
+                <a:tc>
+                  <a:txBody>
+                    <a:bodyPr/>
+                    <a:lstStyle/>
+                    <a:p>
+                      <a:pPr latinLnBrk="1"/>
+                      <a:r>
+                        <a:rPr lang="en-US" altLang="ko-KR" dirty="0"/>
+                        <a:t>0x00000000</a:t>
+                      </a:r>
+                      <a:endParaRPr lang="ko-KR" altLang="en-US" dirty="0"/>
+                    </a:p>
+                  </a:txBody>
+                  <a:tcPr/>
+                </a:tc>
+                <a:tc>
+                  <a:txBody>
+                    <a:bodyPr/>
+                    <a:lstStyle/>
+                    <a:p>
+                      <a:pPr latinLnBrk="1"/>
+                      <a:r>
+                        <a:rPr lang="en-US" altLang="ko-KR" dirty="0"/>
+                        <a:t>0x00000010</a:t>
+                      </a:r>
+                      <a:endParaRPr lang="ko-KR" altLang="en-US" dirty="0"/>
+                    </a:p>
+                  </a:txBody>
+                  <a:tcPr/>
+                </a:tc>
+                <a:tc>
+                  <a:txBody>
+                    <a:bodyPr/>
+                    <a:lstStyle/>
+                    <a:p>
+                      <a:pPr latinLnBrk="1"/>
+                      <a:r>
+                        <a:rPr lang="en-US" altLang="ko-KR" dirty="0" err="1"/>
+                        <a:t>nzcv</a:t>
+                      </a:r>
                       <a:endParaRPr lang="ko-KR" altLang="en-US" dirty="0"/>
                     </a:p>
                   </a:txBody>
@@ -6521,50 +6773,70 @@
                     <a:lstStyle/>
                     <a:p>
                       <a:pPr latinLnBrk="1"/>
-                      <a:endParaRPr lang="ko-KR" altLang="en-US" dirty="0"/>
-                    </a:p>
-                  </a:txBody>
-                  <a:tcPr/>
-                </a:tc>
-                <a:tc>
-                  <a:txBody>
-                    <a:bodyPr/>
-                    <a:lstStyle/>
-                    <a:p>
-                      <a:pPr latinLnBrk="1"/>
-                      <a:endParaRPr lang="ko-KR" altLang="en-US" dirty="0"/>
-                    </a:p>
-                  </a:txBody>
-                  <a:tcPr/>
-                </a:tc>
-                <a:tc>
-                  <a:txBody>
-                    <a:bodyPr/>
-                    <a:lstStyle/>
-                    <a:p>
-                      <a:pPr latinLnBrk="1"/>
-                      <a:endParaRPr lang="ko-KR" altLang="en-US"/>
-                    </a:p>
-                  </a:txBody>
-                  <a:tcPr/>
-                </a:tc>
-                <a:tc>
-                  <a:txBody>
-                    <a:bodyPr/>
-                    <a:lstStyle/>
-                    <a:p>
-                      <a:pPr latinLnBrk="1"/>
-                      <a:endParaRPr lang="ko-KR" altLang="en-US" dirty="0"/>
-                    </a:p>
-                  </a:txBody>
-                  <a:tcPr/>
-                </a:tc>
-                <a:tc>
-                  <a:txBody>
-                    <a:bodyPr/>
-                    <a:lstStyle/>
-                    <a:p>
-                      <a:pPr latinLnBrk="1"/>
+                      <a:r>
+                        <a:rPr lang="en-US" altLang="ko-KR" dirty="0"/>
+                        <a:t>0x00000030</a:t>
+                      </a:r>
+                      <a:endParaRPr lang="ko-KR" altLang="en-US" dirty="0"/>
+                    </a:p>
+                  </a:txBody>
+                  <a:tcPr/>
+                </a:tc>
+                <a:tc>
+                  <a:txBody>
+                    <a:bodyPr/>
+                    <a:lstStyle/>
+                    <a:p>
+                      <a:pPr latinLnBrk="1"/>
+                      <a:r>
+                        <a:rPr lang="en-US" altLang="ko-KR" dirty="0"/>
+                        <a:t>0x00000050</a:t>
+                      </a:r>
+                      <a:endParaRPr lang="ko-KR" altLang="en-US" dirty="0"/>
+                    </a:p>
+                  </a:txBody>
+                  <a:tcPr/>
+                </a:tc>
+                <a:tc>
+                  <a:txBody>
+                    <a:bodyPr/>
+                    <a:lstStyle/>
+                    <a:p>
+                      <a:pPr latinLnBrk="1"/>
+                      <a:r>
+                        <a:rPr lang="en-US" altLang="ko-KR" dirty="0"/>
+                        <a:t>0x00000010</a:t>
+                      </a:r>
+                      <a:endParaRPr lang="ko-KR" altLang="en-US" dirty="0"/>
+                    </a:p>
+                  </a:txBody>
+                  <a:tcPr/>
+                </a:tc>
+                <a:tc>
+                  <a:txBody>
+                    <a:bodyPr/>
+                    <a:lstStyle/>
+                    <a:p>
+                      <a:pPr latinLnBrk="1"/>
+                      <a:r>
+                        <a:rPr lang="en-US" altLang="ko-KR" dirty="0"/>
+                        <a:t>0x00000070</a:t>
+                      </a:r>
+                      <a:endParaRPr lang="ko-KR" altLang="en-US" dirty="0"/>
+                    </a:p>
+                  </a:txBody>
+                  <a:tcPr/>
+                </a:tc>
+                <a:tc>
+                  <a:txBody>
+                    <a:bodyPr/>
+                    <a:lstStyle/>
+                    <a:p>
+                      <a:pPr latinLnBrk="1"/>
+                      <a:r>
+                        <a:rPr lang="en-US" altLang="ko-KR" dirty="0" err="1"/>
+                        <a:t>nzcv</a:t>
+                      </a:r>
                       <a:endParaRPr lang="ko-KR" altLang="en-US" dirty="0"/>
                     </a:p>
                   </a:txBody>
@@ -6598,50 +6870,70 @@
                     <a:lstStyle/>
                     <a:p>
                       <a:pPr latinLnBrk="1"/>
-                      <a:endParaRPr lang="ko-KR" altLang="en-US" dirty="0"/>
-                    </a:p>
-                  </a:txBody>
-                  <a:tcPr/>
-                </a:tc>
-                <a:tc>
-                  <a:txBody>
-                    <a:bodyPr/>
-                    <a:lstStyle/>
-                    <a:p>
-                      <a:pPr latinLnBrk="1"/>
-                      <a:endParaRPr lang="ko-KR" altLang="en-US" dirty="0"/>
-                    </a:p>
-                  </a:txBody>
-                  <a:tcPr/>
-                </a:tc>
-                <a:tc>
-                  <a:txBody>
-                    <a:bodyPr/>
-                    <a:lstStyle/>
-                    <a:p>
-                      <a:pPr latinLnBrk="1"/>
-                      <a:endParaRPr lang="ko-KR" altLang="en-US" dirty="0"/>
-                    </a:p>
-                  </a:txBody>
-                  <a:tcPr/>
-                </a:tc>
-                <a:tc>
-                  <a:txBody>
-                    <a:bodyPr/>
-                    <a:lstStyle/>
-                    <a:p>
-                      <a:pPr latinLnBrk="1"/>
-                      <a:endParaRPr lang="ko-KR" altLang="en-US" dirty="0"/>
-                    </a:p>
-                  </a:txBody>
-                  <a:tcPr/>
-                </a:tc>
-                <a:tc>
-                  <a:txBody>
-                    <a:bodyPr/>
-                    <a:lstStyle/>
-                    <a:p>
-                      <a:pPr latinLnBrk="1"/>
+                      <a:r>
+                        <a:rPr lang="en-US" altLang="ko-KR" dirty="0"/>
+                        <a:t>0x00000030</a:t>
+                      </a:r>
+                      <a:endParaRPr lang="ko-KR" altLang="en-US" dirty="0"/>
+                    </a:p>
+                  </a:txBody>
+                  <a:tcPr/>
+                </a:tc>
+                <a:tc>
+                  <a:txBody>
+                    <a:bodyPr/>
+                    <a:lstStyle/>
+                    <a:p>
+                      <a:pPr latinLnBrk="1"/>
+                      <a:r>
+                        <a:rPr lang="en-US" altLang="ko-KR" dirty="0"/>
+                        <a:t>0x00000050</a:t>
+                      </a:r>
+                      <a:endParaRPr lang="ko-KR" altLang="en-US" dirty="0"/>
+                    </a:p>
+                  </a:txBody>
+                  <a:tcPr/>
+                </a:tc>
+                <a:tc>
+                  <a:txBody>
+                    <a:bodyPr/>
+                    <a:lstStyle/>
+                    <a:p>
+                      <a:pPr latinLnBrk="1"/>
+                      <a:r>
+                        <a:rPr lang="en-US" altLang="ko-KR" dirty="0"/>
+                        <a:t>0x00000070</a:t>
+                      </a:r>
+                      <a:endParaRPr lang="ko-KR" altLang="en-US" dirty="0"/>
+                    </a:p>
+                  </a:txBody>
+                  <a:tcPr/>
+                </a:tc>
+                <a:tc>
+                  <a:txBody>
+                    <a:bodyPr/>
+                    <a:lstStyle/>
+                    <a:p>
+                      <a:pPr latinLnBrk="1"/>
+                      <a:r>
+                        <a:rPr lang="en-US" altLang="ko-KR" dirty="0"/>
+                        <a:t>0x00000060</a:t>
+                      </a:r>
+                      <a:endParaRPr lang="ko-KR" altLang="en-US" dirty="0"/>
+                    </a:p>
+                  </a:txBody>
+                  <a:tcPr/>
+                </a:tc>
+                <a:tc>
+                  <a:txBody>
+                    <a:bodyPr/>
+                    <a:lstStyle/>
+                    <a:p>
+                      <a:pPr latinLnBrk="1"/>
+                      <a:r>
+                        <a:rPr lang="en-US" altLang="ko-KR" dirty="0" err="1"/>
+                        <a:t>nzcv</a:t>
+                      </a:r>
                       <a:endParaRPr lang="ko-KR" altLang="en-US" dirty="0"/>
                     </a:p>
                   </a:txBody>
@@ -6675,50 +6967,70 @@
                     <a:lstStyle/>
                     <a:p>
                       <a:pPr latinLnBrk="1"/>
-                      <a:endParaRPr lang="ko-KR" altLang="en-US" dirty="0"/>
-                    </a:p>
-                  </a:txBody>
-                  <a:tcPr/>
-                </a:tc>
-                <a:tc>
-                  <a:txBody>
-                    <a:bodyPr/>
-                    <a:lstStyle/>
-                    <a:p>
-                      <a:pPr latinLnBrk="1"/>
-                      <a:endParaRPr lang="ko-KR" altLang="en-US" dirty="0"/>
-                    </a:p>
-                  </a:txBody>
-                  <a:tcPr/>
-                </a:tc>
-                <a:tc>
-                  <a:txBody>
-                    <a:bodyPr/>
-                    <a:lstStyle/>
-                    <a:p>
-                      <a:pPr latinLnBrk="1"/>
-                      <a:endParaRPr lang="ko-KR" altLang="en-US" dirty="0"/>
-                    </a:p>
-                  </a:txBody>
-                  <a:tcPr/>
-                </a:tc>
-                <a:tc>
-                  <a:txBody>
-                    <a:bodyPr/>
-                    <a:lstStyle/>
-                    <a:p>
-                      <a:pPr latinLnBrk="1"/>
-                      <a:endParaRPr lang="ko-KR" altLang="en-US" dirty="0"/>
-                    </a:p>
-                  </a:txBody>
-                  <a:tcPr/>
-                </a:tc>
-                <a:tc>
-                  <a:txBody>
-                    <a:bodyPr/>
-                    <a:lstStyle/>
-                    <a:p>
-                      <a:pPr latinLnBrk="1"/>
+                      <a:r>
+                        <a:rPr lang="en-US" altLang="ko-KR" dirty="0"/>
+                        <a:t>0x00000030</a:t>
+                      </a:r>
+                      <a:endParaRPr lang="ko-KR" altLang="en-US" dirty="0"/>
+                    </a:p>
+                  </a:txBody>
+                  <a:tcPr/>
+                </a:tc>
+                <a:tc>
+                  <a:txBody>
+                    <a:bodyPr/>
+                    <a:lstStyle/>
+                    <a:p>
+                      <a:pPr latinLnBrk="1"/>
+                      <a:r>
+                        <a:rPr lang="en-US" altLang="ko-KR" dirty="0"/>
+                        <a:t>0x00000050</a:t>
+                      </a:r>
+                      <a:endParaRPr lang="ko-KR" altLang="en-US" dirty="0"/>
+                    </a:p>
+                  </a:txBody>
+                  <a:tcPr/>
+                </a:tc>
+                <a:tc>
+                  <a:txBody>
+                    <a:bodyPr/>
+                    <a:lstStyle/>
+                    <a:p>
+                      <a:pPr latinLnBrk="1"/>
+                      <a:r>
+                        <a:rPr lang="en-US" altLang="ko-KR" dirty="0"/>
+                        <a:t>0x00000060</a:t>
+                      </a:r>
+                      <a:endParaRPr lang="ko-KR" altLang="en-US" dirty="0"/>
+                    </a:p>
+                  </a:txBody>
+                  <a:tcPr/>
+                </a:tc>
+                <a:tc>
+                  <a:txBody>
+                    <a:bodyPr/>
+                    <a:lstStyle/>
+                    <a:p>
+                      <a:pPr latinLnBrk="1"/>
+                      <a:r>
+                        <a:rPr lang="en-US" altLang="ko-KR" dirty="0"/>
+                        <a:t>0x00000020</a:t>
+                      </a:r>
+                      <a:endParaRPr lang="ko-KR" altLang="en-US" dirty="0"/>
+                    </a:p>
+                  </a:txBody>
+                  <a:tcPr/>
+                </a:tc>
+                <a:tc>
+                  <a:txBody>
+                    <a:bodyPr/>
+                    <a:lstStyle/>
+                    <a:p>
+                      <a:pPr latinLnBrk="1"/>
+                      <a:r>
+                        <a:rPr lang="en-US" altLang="ko-KR" dirty="0" err="1"/>
+                        <a:t>nzcv</a:t>
+                      </a:r>
                       <a:endParaRPr lang="ko-KR" altLang="en-US" dirty="0"/>
                     </a:p>
                   </a:txBody>
@@ -6752,50 +7064,70 @@
                     <a:lstStyle/>
                     <a:p>
                       <a:pPr latinLnBrk="1"/>
-                      <a:endParaRPr lang="ko-KR" altLang="en-US"/>
-                    </a:p>
-                  </a:txBody>
-                  <a:tcPr/>
-                </a:tc>
-                <a:tc>
-                  <a:txBody>
-                    <a:bodyPr/>
-                    <a:lstStyle/>
-                    <a:p>
-                      <a:pPr latinLnBrk="1"/>
-                      <a:endParaRPr lang="ko-KR" altLang="en-US"/>
-                    </a:p>
-                  </a:txBody>
-                  <a:tcPr/>
-                </a:tc>
-                <a:tc>
-                  <a:txBody>
-                    <a:bodyPr/>
-                    <a:lstStyle/>
-                    <a:p>
-                      <a:pPr latinLnBrk="1"/>
-                      <a:endParaRPr lang="ko-KR" altLang="en-US" dirty="0"/>
-                    </a:p>
-                  </a:txBody>
-                  <a:tcPr/>
-                </a:tc>
-                <a:tc>
-                  <a:txBody>
-                    <a:bodyPr/>
-                    <a:lstStyle/>
-                    <a:p>
-                      <a:pPr latinLnBrk="1"/>
-                      <a:endParaRPr lang="ko-KR" altLang="en-US" dirty="0"/>
-                    </a:p>
-                  </a:txBody>
-                  <a:tcPr/>
-                </a:tc>
-                <a:tc>
-                  <a:txBody>
-                    <a:bodyPr/>
-                    <a:lstStyle/>
-                    <a:p>
-                      <a:pPr latinLnBrk="1"/>
+                      <a:r>
+                        <a:rPr lang="en-US" altLang="ko-KR" dirty="0"/>
+                        <a:t>0x00000030</a:t>
+                      </a:r>
+                      <a:endParaRPr lang="ko-KR" altLang="en-US" dirty="0"/>
+                    </a:p>
+                  </a:txBody>
+                  <a:tcPr/>
+                </a:tc>
+                <a:tc>
+                  <a:txBody>
+                    <a:bodyPr/>
+                    <a:lstStyle/>
+                    <a:p>
+                      <a:pPr latinLnBrk="1"/>
+                      <a:r>
+                        <a:rPr lang="en-US" altLang="ko-KR" dirty="0"/>
+                        <a:t>0x00000050</a:t>
+                      </a:r>
+                      <a:endParaRPr lang="ko-KR" altLang="en-US" dirty="0"/>
+                    </a:p>
+                  </a:txBody>
+                  <a:tcPr/>
+                </a:tc>
+                <a:tc>
+                  <a:txBody>
+                    <a:bodyPr/>
+                    <a:lstStyle/>
+                    <a:p>
+                      <a:pPr latinLnBrk="1"/>
+                      <a:r>
+                        <a:rPr lang="en-US" altLang="ko-KR" dirty="0"/>
+                        <a:t>0x00000020</a:t>
+                      </a:r>
+                      <a:endParaRPr lang="ko-KR" altLang="en-US" dirty="0"/>
+                    </a:p>
+                  </a:txBody>
+                  <a:tcPr/>
+                </a:tc>
+                <a:tc>
+                  <a:txBody>
+                    <a:bodyPr/>
+                    <a:lstStyle/>
+                    <a:p>
+                      <a:pPr latinLnBrk="1"/>
+                      <a:r>
+                        <a:rPr lang="en-US" altLang="ko-KR" dirty="0"/>
+                        <a:t>0x00000020</a:t>
+                      </a:r>
+                      <a:endParaRPr lang="ko-KR" altLang="en-US" dirty="0"/>
+                    </a:p>
+                  </a:txBody>
+                  <a:tcPr/>
+                </a:tc>
+                <a:tc>
+                  <a:txBody>
+                    <a:bodyPr/>
+                    <a:lstStyle/>
+                    <a:p>
+                      <a:pPr latinLnBrk="1"/>
+                      <a:r>
+                        <a:rPr lang="en-US" altLang="ko-KR" dirty="0" err="1"/>
+                        <a:t>nzcv</a:t>
+                      </a:r>
                       <a:endParaRPr lang="ko-KR" altLang="en-US" dirty="0"/>
                     </a:p>
                   </a:txBody>
@@ -6829,50 +7161,70 @@
                     <a:lstStyle/>
                     <a:p>
                       <a:pPr latinLnBrk="1"/>
-                      <a:endParaRPr lang="ko-KR" altLang="en-US" dirty="0"/>
-                    </a:p>
-                  </a:txBody>
-                  <a:tcPr/>
-                </a:tc>
-                <a:tc>
-                  <a:txBody>
-                    <a:bodyPr/>
-                    <a:lstStyle/>
-                    <a:p>
-                      <a:pPr latinLnBrk="1"/>
-                      <a:endParaRPr lang="ko-KR" altLang="en-US" dirty="0"/>
-                    </a:p>
-                  </a:txBody>
-                  <a:tcPr/>
-                </a:tc>
-                <a:tc>
-                  <a:txBody>
-                    <a:bodyPr/>
-                    <a:lstStyle/>
-                    <a:p>
-                      <a:pPr latinLnBrk="1"/>
-                      <a:endParaRPr lang="ko-KR" altLang="en-US" dirty="0"/>
-                    </a:p>
-                  </a:txBody>
-                  <a:tcPr/>
-                </a:tc>
-                <a:tc>
-                  <a:txBody>
-                    <a:bodyPr/>
-                    <a:lstStyle/>
-                    <a:p>
-                      <a:pPr latinLnBrk="1"/>
-                      <a:endParaRPr lang="ko-KR" altLang="en-US" dirty="0"/>
-                    </a:p>
-                  </a:txBody>
-                  <a:tcPr/>
-                </a:tc>
-                <a:tc>
-                  <a:txBody>
-                    <a:bodyPr/>
-                    <a:lstStyle/>
-                    <a:p>
-                      <a:pPr latinLnBrk="1"/>
+                      <a:r>
+                        <a:rPr lang="en-US" altLang="ko-KR" dirty="0"/>
+                        <a:t>0x00000030</a:t>
+                      </a:r>
+                      <a:endParaRPr lang="ko-KR" altLang="en-US" dirty="0"/>
+                    </a:p>
+                  </a:txBody>
+                  <a:tcPr/>
+                </a:tc>
+                <a:tc>
+                  <a:txBody>
+                    <a:bodyPr/>
+                    <a:lstStyle/>
+                    <a:p>
+                      <a:pPr latinLnBrk="1"/>
+                      <a:r>
+                        <a:rPr lang="en-US" altLang="ko-KR" dirty="0"/>
+                        <a:t>0x00000050</a:t>
+                      </a:r>
+                      <a:endParaRPr lang="ko-KR" altLang="en-US" dirty="0"/>
+                    </a:p>
+                  </a:txBody>
+                  <a:tcPr/>
+                </a:tc>
+                <a:tc>
+                  <a:txBody>
+                    <a:bodyPr/>
+                    <a:lstStyle/>
+                    <a:p>
+                      <a:pPr latinLnBrk="1"/>
+                      <a:r>
+                        <a:rPr lang="en-US" altLang="ko-KR" dirty="0"/>
+                        <a:t>0x00000020</a:t>
+                      </a:r>
+                      <a:endParaRPr lang="ko-KR" altLang="en-US" dirty="0"/>
+                    </a:p>
+                  </a:txBody>
+                  <a:tcPr/>
+                </a:tc>
+                <a:tc>
+                  <a:txBody>
+                    <a:bodyPr/>
+                    <a:lstStyle/>
+                    <a:p>
+                      <a:pPr latinLnBrk="1"/>
+                      <a:r>
+                        <a:rPr lang="en-US" altLang="ko-KR" dirty="0"/>
+                        <a:t>0x00000000</a:t>
+                      </a:r>
+                      <a:endParaRPr lang="ko-KR" altLang="en-US" dirty="0"/>
+                    </a:p>
+                  </a:txBody>
+                  <a:tcPr/>
+                </a:tc>
+                <a:tc>
+                  <a:txBody>
+                    <a:bodyPr/>
+                    <a:lstStyle/>
+                    <a:p>
+                      <a:pPr latinLnBrk="1"/>
+                      <a:r>
+                        <a:rPr lang="en-US" altLang="ko-KR" dirty="0" err="1"/>
+                        <a:t>nzcv</a:t>
+                      </a:r>
                       <a:endParaRPr lang="ko-KR" altLang="en-US" dirty="0"/>
                     </a:p>
                   </a:txBody>
@@ -6906,50 +7258,70 @@
                     <a:lstStyle/>
                     <a:p>
                       <a:pPr latinLnBrk="1"/>
-                      <a:endParaRPr lang="ko-KR" altLang="en-US" dirty="0"/>
-                    </a:p>
-                  </a:txBody>
-                  <a:tcPr/>
-                </a:tc>
-                <a:tc>
-                  <a:txBody>
-                    <a:bodyPr/>
-                    <a:lstStyle/>
-                    <a:p>
-                      <a:pPr latinLnBrk="1"/>
-                      <a:endParaRPr lang="ko-KR" altLang="en-US" dirty="0"/>
-                    </a:p>
-                  </a:txBody>
-                  <a:tcPr/>
-                </a:tc>
-                <a:tc>
-                  <a:txBody>
-                    <a:bodyPr/>
-                    <a:lstStyle/>
-                    <a:p>
-                      <a:pPr latinLnBrk="1"/>
-                      <a:endParaRPr lang="ko-KR" altLang="en-US" dirty="0"/>
-                    </a:p>
-                  </a:txBody>
-                  <a:tcPr/>
-                </a:tc>
-                <a:tc>
-                  <a:txBody>
-                    <a:bodyPr/>
-                    <a:lstStyle/>
-                    <a:p>
-                      <a:pPr latinLnBrk="1"/>
-                      <a:endParaRPr lang="ko-KR" altLang="en-US" dirty="0"/>
-                    </a:p>
-                  </a:txBody>
-                  <a:tcPr/>
-                </a:tc>
-                <a:tc>
-                  <a:txBody>
-                    <a:bodyPr/>
-                    <a:lstStyle/>
-                    <a:p>
-                      <a:pPr latinLnBrk="1"/>
+                      <a:r>
+                        <a:rPr lang="en-US" altLang="ko-KR" dirty="0"/>
+                        <a:t>0x00000030</a:t>
+                      </a:r>
+                      <a:endParaRPr lang="ko-KR" altLang="en-US" dirty="0"/>
+                    </a:p>
+                  </a:txBody>
+                  <a:tcPr/>
+                </a:tc>
+                <a:tc>
+                  <a:txBody>
+                    <a:bodyPr/>
+                    <a:lstStyle/>
+                    <a:p>
+                      <a:pPr latinLnBrk="1"/>
+                      <a:r>
+                        <a:rPr lang="en-US" altLang="ko-KR" dirty="0"/>
+                        <a:t>0x00000050</a:t>
+                      </a:r>
+                      <a:endParaRPr lang="ko-KR" altLang="en-US" dirty="0"/>
+                    </a:p>
+                  </a:txBody>
+                  <a:tcPr/>
+                </a:tc>
+                <a:tc>
+                  <a:txBody>
+                    <a:bodyPr/>
+                    <a:lstStyle/>
+                    <a:p>
+                      <a:pPr latinLnBrk="1"/>
+                      <a:r>
+                        <a:rPr lang="en-US" altLang="ko-KR" dirty="0"/>
+                        <a:t>0x00000020</a:t>
+                      </a:r>
+                      <a:endParaRPr lang="ko-KR" altLang="en-US" dirty="0"/>
+                    </a:p>
+                  </a:txBody>
+                  <a:tcPr/>
+                </a:tc>
+                <a:tc>
+                  <a:txBody>
+                    <a:bodyPr/>
+                    <a:lstStyle/>
+                    <a:p>
+                      <a:pPr latinLnBrk="1"/>
+                      <a:r>
+                        <a:rPr lang="en-US" altLang="ko-KR" dirty="0"/>
+                        <a:t>0x00000000</a:t>
+                      </a:r>
+                      <a:endParaRPr lang="ko-KR" altLang="en-US" dirty="0"/>
+                    </a:p>
+                  </a:txBody>
+                  <a:tcPr/>
+                </a:tc>
+                <a:tc>
+                  <a:txBody>
+                    <a:bodyPr/>
+                    <a:lstStyle/>
+                    <a:p>
+                      <a:pPr latinLnBrk="1"/>
+                      <a:r>
+                        <a:rPr lang="en-US" altLang="ko-KR" dirty="0" err="1"/>
+                        <a:t>nZcv</a:t>
+                      </a:r>
                       <a:endParaRPr lang="ko-KR" altLang="en-US" dirty="0"/>
                     </a:p>
                   </a:txBody>

</xml_diff>